<commit_message>
Update vehicle speed detection presentation with new findings
</commit_message>
<xml_diff>
--- a/Presentation_Vehicle_Speed_Detection.pptx
+++ b/Presentation_Vehicle_Speed_Detection.pptx
@@ -12405,7 +12405,7 @@
         <p:spPr>
           <a:xfrm>
             <a:off x="1803142" y="839729"/>
-            <a:ext cx="6177476" cy="876486"/>
+            <a:ext cx="6177476" cy="1205395"/>
           </a:xfrm>
           <a:prstGeom prst="rect">
             <a:avLst/>
@@ -12423,6 +12423,18 @@
               </a:lnSpc>
             </a:pPr>
             <a:r>
+              <a:rPr lang="en-US" sz="2241" dirty="0">
+                <a:solidFill>
+                  <a:srgbClr val="FFFFFF"/>
+                </a:solidFill>
+                <a:latin typeface="Fredoka"/>
+                <a:ea typeface="Fredoka"/>
+                <a:cs typeface="Fredoka"/>
+                <a:sym typeface="Fredoka"/>
+              </a:rPr>
+              <a:t>TRADITIONAL METHOD </a:t>
+            </a:r>
+            <a:r>
               <a:rPr lang="en-US" sz="2241">
                 <a:solidFill>
                   <a:srgbClr val="FFFFFF"/>
@@ -12432,7 +12444,7 @@
                 <a:cs typeface="Fredoka"/>
                 <a:sym typeface="Fredoka"/>
               </a:rPr>
-              <a:t>TRADITIONAL METHOD 2 - HAAR CASCADE</a:t>
+              <a:t>2 </a:t>
             </a:r>
           </a:p>
           <a:p>
@@ -12451,16 +12463,28 @@
                 <a:cs typeface="Fredoka"/>
                 <a:sym typeface="Fredoka"/>
               </a:rPr>
-              <a:t>BACKGROUND SUBTRACTION</a:t>
+              <a:t>HAAR </a:t>
+            </a:r>
+            <a:r>
+              <a:rPr lang="en-US" sz="2241" dirty="0">
+                <a:solidFill>
+                  <a:srgbClr val="FFFFFF"/>
+                </a:solidFill>
+                <a:latin typeface="Fredoka"/>
+                <a:ea typeface="Fredoka"/>
+                <a:cs typeface="Fredoka"/>
+                <a:sym typeface="Fredoka"/>
+              </a:rPr>
+              <a:t>CASCADE</a:t>
             </a:r>
           </a:p>
           <a:p>
             <a:pPr algn="ctr">
               <a:lnSpc>
-                <a:spcPts val="1256"/>
+                <a:spcPts val="2241"/>
               </a:lnSpc>
             </a:pPr>
-            <a:endParaRPr lang="en-US" sz="2241">
+            <a:endParaRPr lang="en-US" sz="2241" dirty="0">
               <a:solidFill>
                 <a:srgbClr val="FFFFFF"/>
               </a:solidFill>
@@ -12476,7 +12500,23 @@
                 <a:spcPts val="1256"/>
               </a:lnSpc>
             </a:pPr>
-            <a:endParaRPr lang="en-US" sz="2241">
+            <a:endParaRPr lang="en-US" sz="2241" dirty="0">
+              <a:solidFill>
+                <a:srgbClr val="FFFFFF"/>
+              </a:solidFill>
+              <a:latin typeface="Fredoka"/>
+              <a:ea typeface="Fredoka"/>
+              <a:cs typeface="Fredoka"/>
+              <a:sym typeface="Fredoka"/>
+            </a:endParaRPr>
+          </a:p>
+          <a:p>
+            <a:pPr algn="ctr">
+              <a:lnSpc>
+                <a:spcPts val="1256"/>
+              </a:lnSpc>
+            </a:pPr>
+            <a:endParaRPr lang="en-US" sz="2241" dirty="0">
               <a:solidFill>
                 <a:srgbClr val="FFFFFF"/>
               </a:solidFill>
@@ -13340,7 +13380,7 @@
         <p:spPr>
           <a:xfrm>
             <a:off x="1803142" y="839729"/>
-            <a:ext cx="6177476" cy="876486"/>
+            <a:ext cx="6177476" cy="923266"/>
           </a:xfrm>
           <a:prstGeom prst="rect">
             <a:avLst/>
@@ -13358,7 +13398,7 @@
               </a:lnSpc>
             </a:pPr>
             <a:r>
-              <a:rPr lang="en-US" sz="2241">
+              <a:rPr lang="en-US" sz="2241" dirty="0">
                 <a:solidFill>
                   <a:srgbClr val="FFFFFF"/>
                 </a:solidFill>
@@ -13367,7 +13407,7 @@
                 <a:cs typeface="Fredoka"/>
                 <a:sym typeface="Fredoka"/>
               </a:rPr>
-              <a:t>TRADITIONAL METHOD 2 - HAAR CASCADE</a:t>
+              <a:t>TRADITIONAL METHOD 2 </a:t>
             </a:r>
           </a:p>
           <a:p>
@@ -13377,7 +13417,7 @@
               </a:lnSpc>
             </a:pPr>
             <a:r>
-              <a:rPr lang="en-US" sz="2241">
+              <a:rPr lang="en-US" sz="2241" dirty="0">
                 <a:solidFill>
                   <a:srgbClr val="FFFFFF"/>
                 </a:solidFill>
@@ -13386,7 +13426,7 @@
                 <a:cs typeface="Fredoka"/>
                 <a:sym typeface="Fredoka"/>
               </a:rPr>
-              <a:t>BACKGROUND SUBTRACTION</a:t>
+              <a:t> HAAR CASCADE</a:t>
             </a:r>
           </a:p>
           <a:p>
@@ -13395,7 +13435,7 @@
                 <a:spcPts val="1256"/>
               </a:lnSpc>
             </a:pPr>
-            <a:endParaRPr lang="en-US" sz="2241">
+            <a:endParaRPr lang="en-US" sz="2241" dirty="0">
               <a:solidFill>
                 <a:srgbClr val="FFFFFF"/>
               </a:solidFill>
@@ -13411,7 +13451,7 @@
                 <a:spcPts val="1256"/>
               </a:lnSpc>
             </a:pPr>
-            <a:endParaRPr lang="en-US" sz="2241">
+            <a:endParaRPr lang="en-US" sz="2241" dirty="0">
               <a:solidFill>
                 <a:srgbClr val="FFFFFF"/>
               </a:solidFill>
@@ -15018,7 +15058,7 @@
         </p:nvSpPr>
         <p:spPr>
           <a:xfrm>
-            <a:off x="2594187" y="917618"/>
+            <a:off x="2586057" y="1141590"/>
             <a:ext cx="4565225" cy="961602"/>
           </a:xfrm>
           <a:prstGeom prst="rect">
@@ -15037,7 +15077,7 @@
               </a:lnSpc>
             </a:pPr>
             <a:r>
-              <a:rPr lang="en-US" sz="3733">
+              <a:rPr lang="en-US" sz="3733" dirty="0">
                 <a:solidFill>
                   <a:srgbClr val="FFFFFF"/>
                 </a:solidFill>
@@ -15060,7 +15100,7 @@
         <p:spPr>
           <a:xfrm>
             <a:off x="276763" y="2239289"/>
-            <a:ext cx="1911871" cy="4679423"/>
+            <a:ext cx="1911871" cy="4294702"/>
           </a:xfrm>
           <a:prstGeom prst="rect">
             <a:avLst/>
@@ -15255,22 +15295,6 @@
             </a:endParaRPr>
           </a:p>
           <a:p>
-            <a:pPr algn="ctr">
-              <a:lnSpc>
-                <a:spcPts val="2984"/>
-              </a:lnSpc>
-            </a:pPr>
-            <a:endParaRPr lang="en-US" sz="2131" dirty="0">
-              <a:solidFill>
-                <a:srgbClr val="000000"/>
-              </a:solidFill>
-              <a:latin typeface="TT Fors"/>
-              <a:ea typeface="TT Fors"/>
-              <a:cs typeface="TT Fors"/>
-              <a:sym typeface="TT Fors"/>
-            </a:endParaRPr>
-          </a:p>
-          <a:p>
             <a:pPr marL="460262" lvl="1" indent="-230131" algn="ctr">
               <a:lnSpc>
                 <a:spcPts val="2984"/>
@@ -15302,7 +15326,7 @@
         <p:spPr>
           <a:xfrm>
             <a:off x="2188634" y="1432520"/>
-            <a:ext cx="2395404" cy="5882680"/>
+            <a:ext cx="2395404" cy="5501763"/>
           </a:xfrm>
           <a:prstGeom prst="rect">
             <a:avLst/>
@@ -15535,25 +15559,6 @@
                 <a:spcPct val="0"/>
               </a:spcBef>
             </a:pPr>
-            <a:endParaRPr lang="en-US" sz="2173" dirty="0">
-              <a:solidFill>
-                <a:srgbClr val="000000"/>
-              </a:solidFill>
-              <a:latin typeface="TT Fors"/>
-              <a:ea typeface="TT Fors"/>
-              <a:cs typeface="TT Fors"/>
-              <a:sym typeface="TT Fors"/>
-            </a:endParaRPr>
-          </a:p>
-          <a:p>
-            <a:pPr algn="ctr">
-              <a:lnSpc>
-                <a:spcPts val="3042"/>
-              </a:lnSpc>
-              <a:spcBef>
-                <a:spcPct val="0"/>
-              </a:spcBef>
-            </a:pPr>
             <a:r>
               <a:rPr lang="en-US" sz="2173" dirty="0">
                 <a:solidFill>
@@ -15597,7 +15602,7 @@
         <p:spPr>
           <a:xfrm>
             <a:off x="4695582" y="2349818"/>
-            <a:ext cx="2406230" cy="4820102"/>
+            <a:ext cx="2406230" cy="4448205"/>
           </a:xfrm>
           <a:prstGeom prst="rect">
             <a:avLst/>
@@ -15800,25 +15805,6 @@
                 <a:spcPct val="0"/>
               </a:spcBef>
             </a:pPr>
-            <a:endParaRPr lang="en-US" sz="2039" dirty="0">
-              <a:solidFill>
-                <a:srgbClr val="000000"/>
-              </a:solidFill>
-              <a:latin typeface="TT Fors"/>
-              <a:ea typeface="TT Fors"/>
-              <a:cs typeface="TT Fors"/>
-              <a:sym typeface="TT Fors"/>
-            </a:endParaRPr>
-          </a:p>
-          <a:p>
-            <a:pPr algn="ctr">
-              <a:lnSpc>
-                <a:spcPts val="2855"/>
-              </a:lnSpc>
-              <a:spcBef>
-                <a:spcPct val="0"/>
-              </a:spcBef>
-            </a:pPr>
             <a:r>
               <a:rPr lang="en-US" sz="2039" dirty="0">
                 <a:solidFill>
@@ -15862,7 +15848,7 @@
         <p:spPr>
           <a:xfrm>
             <a:off x="7101812" y="2349818"/>
-            <a:ext cx="2406230" cy="4691651"/>
+            <a:ext cx="2406230" cy="4448205"/>
           </a:xfrm>
           <a:prstGeom prst="rect">
             <a:avLst/>
@@ -15883,7 +15869,7 @@
               </a:spcBef>
             </a:pPr>
             <a:r>
-              <a:rPr lang="en-US" sz="2039" b="1" u="sng">
+              <a:rPr lang="en-US" sz="2039" b="1" u="sng" dirty="0">
                 <a:solidFill>
                   <a:srgbClr val="724E39"/>
                 </a:solidFill>
@@ -15905,7 +15891,7 @@
               </a:spcBef>
             </a:pPr>
             <a:r>
-              <a:rPr lang="en-US" sz="2039">
+              <a:rPr lang="en-US" sz="2039" dirty="0">
                 <a:solidFill>
                   <a:srgbClr val="000000"/>
                 </a:solidFill>
@@ -15926,7 +15912,7 @@
                 <a:spcPct val="0"/>
               </a:spcBef>
             </a:pPr>
-            <a:endParaRPr lang="en-US" sz="2039">
+            <a:endParaRPr lang="en-US" sz="2039" dirty="0">
               <a:solidFill>
                 <a:srgbClr val="000000"/>
               </a:solidFill>
@@ -15945,7 +15931,7 @@
                 <a:spcPct val="0"/>
               </a:spcBef>
             </a:pPr>
-            <a:endParaRPr lang="en-US" sz="2039">
+            <a:endParaRPr lang="en-US" sz="2039" dirty="0">
               <a:solidFill>
                 <a:srgbClr val="000000"/>
               </a:solidFill>
@@ -15965,7 +15951,7 @@
               </a:spcBef>
             </a:pPr>
             <a:r>
-              <a:rPr lang="en-US" sz="2039">
+              <a:rPr lang="en-US" sz="2039" dirty="0">
                 <a:solidFill>
                   <a:srgbClr val="000000"/>
                 </a:solidFill>
@@ -15986,7 +15972,7 @@
                 <a:spcPct val="0"/>
               </a:spcBef>
             </a:pPr>
-            <a:endParaRPr lang="en-US" sz="2039">
+            <a:endParaRPr lang="en-US" sz="2039" dirty="0">
               <a:solidFill>
                 <a:srgbClr val="000000"/>
               </a:solidFill>
@@ -16005,7 +15991,7 @@
                 <a:spcPct val="0"/>
               </a:spcBef>
             </a:pPr>
-            <a:endParaRPr lang="en-US" sz="2039">
+            <a:endParaRPr lang="en-US" sz="2039" dirty="0">
               <a:solidFill>
                 <a:srgbClr val="000000"/>
               </a:solidFill>
@@ -16025,7 +16011,7 @@
               </a:spcBef>
             </a:pPr>
             <a:r>
-              <a:rPr lang="en-US" sz="2039">
+              <a:rPr lang="en-US" sz="2039" dirty="0">
                 <a:solidFill>
                   <a:srgbClr val="000000"/>
                 </a:solidFill>
@@ -16046,7 +16032,7 @@
                 <a:spcPct val="0"/>
               </a:spcBef>
             </a:pPr>
-            <a:endParaRPr lang="en-US" sz="2039">
+            <a:endParaRPr lang="en-US" sz="2039" dirty="0">
               <a:solidFill>
                 <a:srgbClr val="000000"/>
               </a:solidFill>
@@ -16065,7 +16051,7 @@
                 <a:spcPct val="0"/>
               </a:spcBef>
             </a:pPr>
-            <a:endParaRPr lang="en-US" sz="2039">
+            <a:endParaRPr lang="en-US" sz="2039" dirty="0">
               <a:solidFill>
                 <a:srgbClr val="000000"/>
               </a:solidFill>
@@ -16084,27 +16070,8 @@
                 <a:spcPct val="0"/>
               </a:spcBef>
             </a:pPr>
-            <a:endParaRPr lang="en-US" sz="2039">
-              <a:solidFill>
-                <a:srgbClr val="000000"/>
-              </a:solidFill>
-              <a:latin typeface="TT Fors"/>
-              <a:ea typeface="TT Fors"/>
-              <a:cs typeface="TT Fors"/>
-              <a:sym typeface="TT Fors"/>
-            </a:endParaRPr>
-          </a:p>
-          <a:p>
-            <a:pPr algn="ctr">
-              <a:lnSpc>
-                <a:spcPts val="2855"/>
-              </a:lnSpc>
-              <a:spcBef>
-                <a:spcPct val="0"/>
-              </a:spcBef>
-            </a:pPr>
-            <a:r>
-              <a:rPr lang="en-US" sz="2039">
+            <a:r>
+              <a:rPr lang="en-US" sz="2039" dirty="0">
                 <a:solidFill>
                   <a:srgbClr val="000000"/>
                 </a:solidFill>
@@ -16125,7 +16092,7 @@
                 <a:spcPct val="0"/>
               </a:spcBef>
             </a:pPr>
-            <a:endParaRPr lang="en-US" sz="2039">
+            <a:endParaRPr lang="en-US" sz="2039" dirty="0">
               <a:solidFill>
                 <a:srgbClr val="000000"/>
               </a:solidFill>

</xml_diff>